<commit_message>
Leg movement speed matches the ground speed now
</commit_message>
<xml_diff>
--- a/src/main/java/com/TheRPGAdventurer/ROTD/client/model/dragon/190706-DragonMountsDragonModel.pptx
+++ b/src/main/java/com/TheRPGAdventurer/ROTD/client/model/dragon/190706-DragonMountsDragonModel.pptx
@@ -12,6 +12,7 @@
     <p:sldId id="263" r:id="rId6"/>
     <p:sldId id="261" r:id="rId7"/>
     <p:sldId id="256" r:id="rId8"/>
+    <p:sldId id="264" r:id="rId9"/>
   </p:sldIdLst>
   <p:sldSz cx="12192000" cy="6858000"/>
   <p:notesSz cx="6858000" cy="9144000"/>
@@ -249,7 +250,7 @@
           <a:p>
             <a:fld id="{D519AFB3-3823-486A-94FF-77052D16F40D}" type="datetimeFigureOut">
               <a:rPr lang="en-AU" smtClean="0"/>
-              <a:t>11/07/2019</a:t>
+              <a:t>13/07/2019</a:t>
             </a:fld>
             <a:endParaRPr lang="en-AU"/>
           </a:p>
@@ -419,7 +420,7 @@
           <a:p>
             <a:fld id="{D519AFB3-3823-486A-94FF-77052D16F40D}" type="datetimeFigureOut">
               <a:rPr lang="en-AU" smtClean="0"/>
-              <a:t>11/07/2019</a:t>
+              <a:t>13/07/2019</a:t>
             </a:fld>
             <a:endParaRPr lang="en-AU"/>
           </a:p>
@@ -599,7 +600,7 @@
           <a:p>
             <a:fld id="{D519AFB3-3823-486A-94FF-77052D16F40D}" type="datetimeFigureOut">
               <a:rPr lang="en-AU" smtClean="0"/>
-              <a:t>11/07/2019</a:t>
+              <a:t>13/07/2019</a:t>
             </a:fld>
             <a:endParaRPr lang="en-AU"/>
           </a:p>
@@ -769,7 +770,7 @@
           <a:p>
             <a:fld id="{D519AFB3-3823-486A-94FF-77052D16F40D}" type="datetimeFigureOut">
               <a:rPr lang="en-AU" smtClean="0"/>
-              <a:t>11/07/2019</a:t>
+              <a:t>13/07/2019</a:t>
             </a:fld>
             <a:endParaRPr lang="en-AU"/>
           </a:p>
@@ -1015,7 +1016,7 @@
           <a:p>
             <a:fld id="{D519AFB3-3823-486A-94FF-77052D16F40D}" type="datetimeFigureOut">
               <a:rPr lang="en-AU" smtClean="0"/>
-              <a:t>11/07/2019</a:t>
+              <a:t>13/07/2019</a:t>
             </a:fld>
             <a:endParaRPr lang="en-AU"/>
           </a:p>
@@ -1247,7 +1248,7 @@
           <a:p>
             <a:fld id="{D519AFB3-3823-486A-94FF-77052D16F40D}" type="datetimeFigureOut">
               <a:rPr lang="en-AU" smtClean="0"/>
-              <a:t>11/07/2019</a:t>
+              <a:t>13/07/2019</a:t>
             </a:fld>
             <a:endParaRPr lang="en-AU"/>
           </a:p>
@@ -1614,7 +1615,7 @@
           <a:p>
             <a:fld id="{D519AFB3-3823-486A-94FF-77052D16F40D}" type="datetimeFigureOut">
               <a:rPr lang="en-AU" smtClean="0"/>
-              <a:t>11/07/2019</a:t>
+              <a:t>13/07/2019</a:t>
             </a:fld>
             <a:endParaRPr lang="en-AU"/>
           </a:p>
@@ -1732,7 +1733,7 @@
           <a:p>
             <a:fld id="{D519AFB3-3823-486A-94FF-77052D16F40D}" type="datetimeFigureOut">
               <a:rPr lang="en-AU" smtClean="0"/>
-              <a:t>11/07/2019</a:t>
+              <a:t>13/07/2019</a:t>
             </a:fld>
             <a:endParaRPr lang="en-AU"/>
           </a:p>
@@ -1827,7 +1828,7 @@
           <a:p>
             <a:fld id="{D519AFB3-3823-486A-94FF-77052D16F40D}" type="datetimeFigureOut">
               <a:rPr lang="en-AU" smtClean="0"/>
-              <a:t>11/07/2019</a:t>
+              <a:t>13/07/2019</a:t>
             </a:fld>
             <a:endParaRPr lang="en-AU"/>
           </a:p>
@@ -2104,7 +2105,7 @@
           <a:p>
             <a:fld id="{D519AFB3-3823-486A-94FF-77052D16F40D}" type="datetimeFigureOut">
               <a:rPr lang="en-AU" smtClean="0"/>
-              <a:t>11/07/2019</a:t>
+              <a:t>13/07/2019</a:t>
             </a:fld>
             <a:endParaRPr lang="en-AU"/>
           </a:p>
@@ -2357,7 +2358,7 @@
           <a:p>
             <a:fld id="{D519AFB3-3823-486A-94FF-77052D16F40D}" type="datetimeFigureOut">
               <a:rPr lang="en-AU" smtClean="0"/>
-              <a:t>11/07/2019</a:t>
+              <a:t>13/07/2019</a:t>
             </a:fld>
             <a:endParaRPr lang="en-AU"/>
           </a:p>
@@ -2570,7 +2571,7 @@
           <a:p>
             <a:fld id="{D519AFB3-3823-486A-94FF-77052D16F40D}" type="datetimeFigureOut">
               <a:rPr lang="en-AU" smtClean="0"/>
-              <a:t>11/07/2019</a:t>
+              <a:t>13/07/2019</a:t>
             </a:fld>
             <a:endParaRPr lang="en-AU"/>
           </a:p>
@@ -3490,15 +3491,7 @@
           <a:p>
             <a:r>
               <a:rPr lang="en-AU" dirty="0" smtClean="0"/>
-              <a:t>[-8,0</a:t>
-            </a:r>
-            <a:r>
-              <a:rPr lang="en-AU" dirty="0" smtClean="0"/>
-              <a:t>,+8</a:t>
-            </a:r>
-            <a:r>
-              <a:rPr lang="en-AU" dirty="0" smtClean="0"/>
-              <a:t>]</a:t>
+              <a:t>[-8,0,+8]</a:t>
             </a:r>
             <a:endParaRPr lang="en-AU" dirty="0"/>
           </a:p>
@@ -3665,15 +3658,7 @@
           <a:p>
             <a:r>
               <a:rPr lang="en-AU" dirty="0" smtClean="0"/>
-              <a:t>[8,16</a:t>
-            </a:r>
-            <a:r>
-              <a:rPr lang="en-AU" dirty="0" smtClean="0"/>
-              <a:t>,-8</a:t>
-            </a:r>
-            <a:r>
-              <a:rPr lang="en-AU" dirty="0" smtClean="0"/>
-              <a:t>]</a:t>
+              <a:t>[8,16,-8]</a:t>
             </a:r>
             <a:endParaRPr lang="en-AU" dirty="0"/>
           </a:p>
@@ -4262,11 +4247,7 @@
           <a:p>
             <a:r>
               <a:rPr lang="en-AU" dirty="0" smtClean="0"/>
-              <a:t>[-1, 3, </a:t>
-            </a:r>
-            <a:r>
-              <a:rPr lang="en-AU" dirty="0" smtClean="0"/>
-              <a:t>-1]</a:t>
+              <a:t>[-1, 3, -1]</a:t>
             </a:r>
             <a:endParaRPr lang="en-AU" dirty="0"/>
           </a:p>
@@ -4397,15 +4378,7 @@
           <a:p>
             <a:r>
               <a:rPr lang="en-AU" dirty="0" smtClean="0"/>
-              <a:t>[1,1, </a:t>
-            </a:r>
-            <a:r>
-              <a:rPr lang="en-AU" dirty="0" smtClean="0"/>
-              <a:t>1</a:t>
-            </a:r>
-            <a:r>
-              <a:rPr lang="en-AU" dirty="0" smtClean="0"/>
-              <a:t>]</a:t>
+              <a:t>[1,1, 1]</a:t>
             </a:r>
             <a:endParaRPr lang="en-AU" dirty="0"/>
           </a:p>
@@ -11003,11 +10976,7 @@
           <a:p>
             <a:r>
               <a:rPr lang="en-AU" dirty="0" smtClean="0"/>
-              <a:t>Body </a:t>
-            </a:r>
-            <a:r>
-              <a:rPr lang="en-AU" dirty="0" smtClean="0"/>
-              <a:t>origin (BC)</a:t>
+              <a:t>Body origin (BC)</a:t>
             </a:r>
             <a:endParaRPr lang="en-AU" dirty="0"/>
           </a:p>
@@ -11418,11 +11387,7 @@
           <a:p>
             <a:r>
               <a:rPr lang="en-AU" dirty="0" smtClean="0"/>
-              <a:t>Body </a:t>
-            </a:r>
-            <a:r>
-              <a:rPr lang="en-AU" dirty="0" smtClean="0"/>
-              <a:t>model origin[0,0,0]</a:t>
+              <a:t>Body model origin[0,0,0]</a:t>
             </a:r>
             <a:endParaRPr lang="en-AU" dirty="0"/>
           </a:p>
@@ -12427,11 +12392,7 @@
           <a:p>
             <a:r>
               <a:rPr lang="en-AU" dirty="0" smtClean="0"/>
-              <a:t>Z </a:t>
-            </a:r>
-            <a:r>
-              <a:rPr lang="en-AU" dirty="0" smtClean="0"/>
-              <a:t>=48</a:t>
+              <a:t>Z =48</a:t>
             </a:r>
             <a:endParaRPr lang="en-AU" dirty="0"/>
           </a:p>
@@ -12563,11 +12524,7 @@
           <a:p>
             <a:r>
               <a:rPr lang="en-AU" dirty="0" smtClean="0"/>
-              <a:t>Z </a:t>
-            </a:r>
-            <a:r>
-              <a:rPr lang="en-AU" dirty="0" smtClean="0"/>
-              <a:t>=-16</a:t>
+              <a:t>Z =-16</a:t>
             </a:r>
             <a:endParaRPr lang="en-AU" dirty="0"/>
           </a:p>
@@ -12699,11 +12656,7 @@
           <a:p>
             <a:r>
               <a:rPr lang="en-AU" dirty="0" smtClean="0"/>
-              <a:t>Z </a:t>
-            </a:r>
-            <a:r>
-              <a:rPr lang="en-AU" dirty="0" smtClean="0"/>
-              <a:t>=16</a:t>
+              <a:t>Z =16</a:t>
             </a:r>
             <a:endParaRPr lang="en-AU" dirty="0"/>
           </a:p>
@@ -13898,21 +13851,7 @@
                 <a:latin typeface="Courier New" panose="02070309020205020404" pitchFamily="49" charset="0"/>
                 <a:cs typeface="Courier New" panose="02070309020205020404" pitchFamily="49" charset="0"/>
               </a:rPr>
-              <a:t>, </a:t>
-            </a:r>
-            <a:r>
-              <a:rPr kumimoji="0" lang="en-US" altLang="en-US" sz="900" b="0" i="0" u="none" strike="noStrike" cap="none" normalizeH="0" baseline="0" dirty="0" smtClean="0">
-                <a:ln>
-                  <a:noFill/>
-                </a:ln>
-                <a:solidFill>
-                  <a:srgbClr val="000000"/>
-                </a:solidFill>
-                <a:effectLst/>
-                <a:latin typeface="Courier New" panose="02070309020205020404" pitchFamily="49" charset="0"/>
-                <a:cs typeface="Courier New" panose="02070309020205020404" pitchFamily="49" charset="0"/>
-              </a:rPr>
-              <a:t>-</a:t>
+              <a:t>, -</a:t>
             </a:r>
             <a:r>
               <a:rPr kumimoji="0" lang="en-US" altLang="en-US" sz="900" b="0" i="0" u="none" strike="noStrike" cap="none" normalizeH="0" baseline="0" dirty="0" smtClean="0">
@@ -14470,21 +14409,7 @@
                 <a:latin typeface="Courier New" panose="02070309020205020404" pitchFamily="49" charset="0"/>
                 <a:cs typeface="Courier New" panose="02070309020205020404" pitchFamily="49" charset="0"/>
               </a:rPr>
-              <a:t>, </a:t>
-            </a:r>
-            <a:r>
-              <a:rPr kumimoji="0" lang="en-US" altLang="en-US" sz="900" b="0" i="0" u="none" strike="noStrike" cap="none" normalizeH="0" baseline="0" dirty="0" smtClean="0">
-                <a:ln>
-                  <a:noFill/>
-                </a:ln>
-                <a:solidFill>
-                  <a:srgbClr val="000000"/>
-                </a:solidFill>
-                <a:effectLst/>
-                <a:latin typeface="Courier New" panose="02070309020205020404" pitchFamily="49" charset="0"/>
-                <a:cs typeface="Courier New" panose="02070309020205020404" pitchFamily="49" charset="0"/>
-              </a:rPr>
-              <a:t>-</a:t>
+              <a:t>, -</a:t>
             </a:r>
             <a:r>
               <a:rPr kumimoji="0" lang="en-US" altLang="en-US" sz="900" b="0" i="0" u="none" strike="noStrike" cap="none" normalizeH="0" baseline="0" dirty="0" smtClean="0">
@@ -14846,21 +14771,7 @@
                 <a:latin typeface="Courier New" panose="02070309020205020404" pitchFamily="49" charset="0"/>
                 <a:cs typeface="Courier New" panose="02070309020205020404" pitchFamily="49" charset="0"/>
               </a:rPr>
-              <a:t>, </a:t>
-            </a:r>
-            <a:r>
-              <a:rPr kumimoji="0" lang="en-US" altLang="en-US" sz="900" b="0" i="0" u="none" strike="noStrike" cap="none" normalizeH="0" baseline="0" dirty="0" smtClean="0">
-                <a:ln>
-                  <a:noFill/>
-                </a:ln>
-                <a:solidFill>
-                  <a:srgbClr val="000000"/>
-                </a:solidFill>
-                <a:effectLst/>
-                <a:latin typeface="Courier New" panose="02070309020205020404" pitchFamily="49" charset="0"/>
-                <a:cs typeface="Courier New" panose="02070309020205020404" pitchFamily="49" charset="0"/>
-              </a:rPr>
-              <a:t>-</a:t>
+              <a:t>, -</a:t>
             </a:r>
             <a:r>
               <a:rPr kumimoji="0" lang="en-US" altLang="en-US" sz="900" b="0" i="0" u="none" strike="noStrike" cap="none" normalizeH="0" baseline="0" dirty="0" smtClean="0">
@@ -15625,20 +15536,6 @@
                 <a:cs typeface="Courier New" panose="02070309020205020404" pitchFamily="49" charset="0"/>
               </a:rPr>
               <a:t>);</a:t>
-            </a:r>
-            <a:r>
-              <a:rPr kumimoji="0" lang="en-US" altLang="en-US" sz="900" b="0" i="0" u="none" strike="noStrike" cap="none" normalizeH="0" baseline="0" dirty="0" smtClean="0">
-                <a:ln>
-                  <a:noFill/>
-                </a:ln>
-                <a:solidFill>
-                  <a:srgbClr val="000000"/>
-                </a:solidFill>
-                <a:effectLst/>
-                <a:latin typeface="Courier New" panose="02070309020205020404" pitchFamily="49" charset="0"/>
-                <a:cs typeface="Courier New" panose="02070309020205020404" pitchFamily="49" charset="0"/>
-              </a:rPr>
-              <a:t/>
             </a:r>
             <a:br>
               <a:rPr kumimoji="0" lang="en-US" altLang="en-US" sz="900" b="0" i="0" u="none" strike="noStrike" cap="none" normalizeH="0" baseline="0" dirty="0" smtClean="0">
@@ -17143,6 +17040,744 @@
     <p:extLst>
       <p:ext uri="{BB962C8B-B14F-4D97-AF65-F5344CB8AC3E}">
         <p14:creationId xmlns:p14="http://schemas.microsoft.com/office/powerpoint/2010/main" val="1956292322"/>
+      </p:ext>
+    </p:extLst>
+  </p:cSld>
+  <p:clrMapOvr>
+    <a:masterClrMapping/>
+  </p:clrMapOvr>
+</p:sld>
+</file>
+
+<file path=ppt/slides/slide8.xml><?xml version="1.0" encoding="utf-8"?>
+<p:sld xmlns:a="http://schemas.openxmlformats.org/drawingml/2006/main" xmlns:r="http://schemas.openxmlformats.org/officeDocument/2006/relationships" xmlns:p="http://schemas.openxmlformats.org/presentationml/2006/main">
+  <p:cSld>
+    <p:spTree>
+      <p:nvGrpSpPr>
+        <p:cNvPr id="1" name=""/>
+        <p:cNvGrpSpPr/>
+        <p:nvPr/>
+      </p:nvGrpSpPr>
+      <p:grpSpPr>
+        <a:xfrm>
+          <a:off x="0" y="0"/>
+          <a:ext cx="0" cy="0"/>
+          <a:chOff x="0" y="0"/>
+          <a:chExt cx="0" cy="0"/>
+        </a:xfrm>
+      </p:grpSpPr>
+      <p:pic>
+        <p:nvPicPr>
+          <p:cNvPr id="4" name="Picture 3"/>
+          <p:cNvPicPr>
+            <a:picLocks noChangeAspect="1"/>
+          </p:cNvPicPr>
+          <p:nvPr/>
+        </p:nvPicPr>
+        <p:blipFill rotWithShape="1">
+          <a:blip r:embed="rId2" cstate="print">
+            <a:extLst>
+              <a:ext uri="{28A0092B-C50C-407E-A947-70E740481C1C}">
+                <a14:useLocalDpi xmlns:a14="http://schemas.microsoft.com/office/drawing/2010/main" val="0"/>
+              </a:ext>
+            </a:extLst>
+          </a:blip>
+          <a:srcRect l="15996" t="1500" r="19836" b="42000"/>
+          <a:stretch/>
+        </p:blipFill>
+        <p:spPr>
+          <a:xfrm>
+            <a:off x="727589" y="851719"/>
+            <a:ext cx="2020529" cy="999941"/>
+          </a:xfrm>
+          <a:prstGeom prst="rect">
+            <a:avLst/>
+          </a:prstGeom>
+        </p:spPr>
+      </p:pic>
+      <p:pic>
+        <p:nvPicPr>
+          <p:cNvPr id="5" name="Picture 4"/>
+          <p:cNvPicPr>
+            <a:picLocks noChangeAspect="1"/>
+          </p:cNvPicPr>
+          <p:nvPr/>
+        </p:nvPicPr>
+        <p:blipFill rotWithShape="1">
+          <a:blip r:embed="rId3" cstate="print">
+            <a:extLst>
+              <a:ext uri="{28A0092B-C50C-407E-A947-70E740481C1C}">
+                <a14:useLocalDpi xmlns:a14="http://schemas.microsoft.com/office/drawing/2010/main" val="0"/>
+              </a:ext>
+            </a:extLst>
+          </a:blip>
+          <a:srcRect l="16089" t="1834" r="19836" b="42667"/>
+          <a:stretch/>
+        </p:blipFill>
+        <p:spPr>
+          <a:xfrm>
+            <a:off x="2751559" y="857619"/>
+            <a:ext cx="2017579" cy="982243"/>
+          </a:xfrm>
+          <a:prstGeom prst="rect">
+            <a:avLst/>
+          </a:prstGeom>
+        </p:spPr>
+      </p:pic>
+      <p:pic>
+        <p:nvPicPr>
+          <p:cNvPr id="6" name="Picture 5"/>
+          <p:cNvPicPr>
+            <a:picLocks noChangeAspect="1"/>
+          </p:cNvPicPr>
+          <p:nvPr/>
+        </p:nvPicPr>
+        <p:blipFill rotWithShape="1">
+          <a:blip r:embed="rId4" cstate="print">
+            <a:extLst>
+              <a:ext uri="{28A0092B-C50C-407E-A947-70E740481C1C}">
+                <a14:useLocalDpi xmlns:a14="http://schemas.microsoft.com/office/drawing/2010/main" val="0"/>
+              </a:ext>
+            </a:extLst>
+          </a:blip>
+          <a:srcRect l="16089" t="1334" r="19836" b="42667"/>
+          <a:stretch/>
+        </p:blipFill>
+        <p:spPr>
+          <a:xfrm>
+            <a:off x="4772579" y="848770"/>
+            <a:ext cx="2017579" cy="991092"/>
+          </a:xfrm>
+          <a:prstGeom prst="rect">
+            <a:avLst/>
+          </a:prstGeom>
+        </p:spPr>
+      </p:pic>
+      <p:pic>
+        <p:nvPicPr>
+          <p:cNvPr id="7" name="Picture 6"/>
+          <p:cNvPicPr>
+            <a:picLocks noChangeAspect="1"/>
+          </p:cNvPicPr>
+          <p:nvPr/>
+        </p:nvPicPr>
+        <p:blipFill rotWithShape="1">
+          <a:blip r:embed="rId5" cstate="print">
+            <a:extLst>
+              <a:ext uri="{28A0092B-C50C-407E-A947-70E740481C1C}">
+                <a14:useLocalDpi xmlns:a14="http://schemas.microsoft.com/office/drawing/2010/main" val="0"/>
+              </a:ext>
+            </a:extLst>
+          </a:blip>
+          <a:srcRect l="16183" t="1833" r="19836" b="42834"/>
+          <a:stretch/>
+        </p:blipFill>
+        <p:spPr>
+          <a:xfrm>
+            <a:off x="6790158" y="847296"/>
+            <a:ext cx="2014630" cy="979293"/>
+          </a:xfrm>
+          <a:prstGeom prst="rect">
+            <a:avLst/>
+          </a:prstGeom>
+        </p:spPr>
+      </p:pic>
+      <p:pic>
+        <p:nvPicPr>
+          <p:cNvPr id="8" name="Picture 7"/>
+          <p:cNvPicPr>
+            <a:picLocks noChangeAspect="1"/>
+          </p:cNvPicPr>
+          <p:nvPr/>
+        </p:nvPicPr>
+        <p:blipFill rotWithShape="1">
+          <a:blip r:embed="rId6" cstate="print">
+            <a:extLst>
+              <a:ext uri="{28A0092B-C50C-407E-A947-70E740481C1C}">
+                <a14:useLocalDpi xmlns:a14="http://schemas.microsoft.com/office/drawing/2010/main" val="0"/>
+              </a:ext>
+            </a:extLst>
+          </a:blip>
+          <a:srcRect l="15902" t="1500" r="19929" b="42834"/>
+          <a:stretch/>
+        </p:blipFill>
+        <p:spPr>
+          <a:xfrm>
+            <a:off x="8809458" y="850246"/>
+            <a:ext cx="2020529" cy="985192"/>
+          </a:xfrm>
+          <a:prstGeom prst="rect">
+            <a:avLst/>
+          </a:prstGeom>
+        </p:spPr>
+      </p:pic>
+      <p:pic>
+        <p:nvPicPr>
+          <p:cNvPr id="9" name="Picture 8"/>
+          <p:cNvPicPr>
+            <a:picLocks noChangeAspect="1"/>
+          </p:cNvPicPr>
+          <p:nvPr/>
+        </p:nvPicPr>
+        <p:blipFill rotWithShape="1">
+          <a:blip r:embed="rId7" cstate="print">
+            <a:extLst>
+              <a:ext uri="{28A0092B-C50C-407E-A947-70E740481C1C}">
+                <a14:useLocalDpi xmlns:a14="http://schemas.microsoft.com/office/drawing/2010/main" val="0"/>
+              </a:ext>
+            </a:extLst>
+          </a:blip>
+          <a:srcRect l="16088" t="1667" r="20118" b="42834"/>
+          <a:stretch/>
+        </p:blipFill>
+        <p:spPr>
+          <a:xfrm>
+            <a:off x="727589" y="2912069"/>
+            <a:ext cx="2008730" cy="982243"/>
+          </a:xfrm>
+          <a:prstGeom prst="rect">
+            <a:avLst/>
+          </a:prstGeom>
+        </p:spPr>
+      </p:pic>
+      <p:pic>
+        <p:nvPicPr>
+          <p:cNvPr id="10" name="Picture 9"/>
+          <p:cNvPicPr>
+            <a:picLocks noChangeAspect="1"/>
+          </p:cNvPicPr>
+          <p:nvPr/>
+        </p:nvPicPr>
+        <p:blipFill rotWithShape="1">
+          <a:blip r:embed="rId8" cstate="print">
+            <a:extLst>
+              <a:ext uri="{28A0092B-C50C-407E-A947-70E740481C1C}">
+                <a14:useLocalDpi xmlns:a14="http://schemas.microsoft.com/office/drawing/2010/main" val="0"/>
+              </a:ext>
+            </a:extLst>
+          </a:blip>
+          <a:srcRect l="15901" t="1667" r="20024" b="42834"/>
+          <a:stretch/>
+        </p:blipFill>
+        <p:spPr>
+          <a:xfrm>
+            <a:off x="2739760" y="2912069"/>
+            <a:ext cx="2017579" cy="982243"/>
+          </a:xfrm>
+          <a:prstGeom prst="rect">
+            <a:avLst/>
+          </a:prstGeom>
+        </p:spPr>
+      </p:pic>
+      <p:pic>
+        <p:nvPicPr>
+          <p:cNvPr id="11" name="Picture 10"/>
+          <p:cNvPicPr>
+            <a:picLocks noChangeAspect="1"/>
+          </p:cNvPicPr>
+          <p:nvPr/>
+        </p:nvPicPr>
+        <p:blipFill rotWithShape="1">
+          <a:blip r:embed="rId9" cstate="print">
+            <a:extLst>
+              <a:ext uri="{28A0092B-C50C-407E-A947-70E740481C1C}">
+                <a14:useLocalDpi xmlns:a14="http://schemas.microsoft.com/office/drawing/2010/main" val="0"/>
+              </a:ext>
+            </a:extLst>
+          </a:blip>
+          <a:srcRect l="15996" t="1500" r="20023" b="42667"/>
+          <a:stretch/>
+        </p:blipFill>
+        <p:spPr>
+          <a:xfrm>
+            <a:off x="4760289" y="2909119"/>
+            <a:ext cx="2014630" cy="988142"/>
+          </a:xfrm>
+          <a:prstGeom prst="rect">
+            <a:avLst/>
+          </a:prstGeom>
+        </p:spPr>
+      </p:pic>
+      <p:pic>
+        <p:nvPicPr>
+          <p:cNvPr id="12" name="Picture 11"/>
+          <p:cNvPicPr>
+            <a:picLocks noChangeAspect="1"/>
+          </p:cNvPicPr>
+          <p:nvPr/>
+        </p:nvPicPr>
+        <p:blipFill rotWithShape="1">
+          <a:blip r:embed="rId10" cstate="print">
+            <a:extLst>
+              <a:ext uri="{28A0092B-C50C-407E-A947-70E740481C1C}">
+                <a14:useLocalDpi xmlns:a14="http://schemas.microsoft.com/office/drawing/2010/main" val="0"/>
+              </a:ext>
+            </a:extLst>
+          </a:blip>
+          <a:srcRect l="16090" t="1834" r="19930" b="42667"/>
+          <a:stretch/>
+        </p:blipFill>
+        <p:spPr>
+          <a:xfrm>
+            <a:off x="6784259" y="2912069"/>
+            <a:ext cx="2014630" cy="982243"/>
+          </a:xfrm>
+          <a:prstGeom prst="rect">
+            <a:avLst/>
+          </a:prstGeom>
+          <a:ln>
+            <a:solidFill>
+              <a:schemeClr val="tx1"/>
+            </a:solidFill>
+          </a:ln>
+        </p:spPr>
+      </p:pic>
+      <p:pic>
+        <p:nvPicPr>
+          <p:cNvPr id="14" name="Picture 13"/>
+          <p:cNvPicPr>
+            <a:picLocks noChangeAspect="1"/>
+          </p:cNvPicPr>
+          <p:nvPr/>
+        </p:nvPicPr>
+        <p:blipFill rotWithShape="1">
+          <a:blip r:embed="rId2" cstate="print">
+            <a:extLst>
+              <a:ext uri="{28A0092B-C50C-407E-A947-70E740481C1C}">
+                <a14:useLocalDpi xmlns:a14="http://schemas.microsoft.com/office/drawing/2010/main" val="0"/>
+              </a:ext>
+            </a:extLst>
+          </a:blip>
+          <a:srcRect l="15996" t="1500" r="19836" b="42000"/>
+          <a:stretch/>
+        </p:blipFill>
+        <p:spPr>
+          <a:xfrm>
+            <a:off x="8798889" y="2903219"/>
+            <a:ext cx="2020529" cy="999941"/>
+          </a:xfrm>
+          <a:prstGeom prst="rect">
+            <a:avLst/>
+          </a:prstGeom>
+        </p:spPr>
+      </p:pic>
+      <p:sp>
+        <p:nvSpPr>
+          <p:cNvPr id="15" name="TextBox 14"/>
+          <p:cNvSpPr txBox="1"/>
+          <p:nvPr/>
+        </p:nvSpPr>
+        <p:spPr>
+          <a:xfrm>
+            <a:off x="1569720" y="1948934"/>
+            <a:ext cx="301686" cy="369332"/>
+          </a:xfrm>
+          <a:prstGeom prst="rect">
+            <a:avLst/>
+          </a:prstGeom>
+          <a:noFill/>
+        </p:spPr>
+        <p:txBody>
+          <a:bodyPr wrap="none" rtlCol="0">
+            <a:spAutoFit/>
+          </a:bodyPr>
+          <a:lstStyle/>
+          <a:p>
+            <a:r>
+              <a:rPr lang="en-AU" dirty="0" smtClean="0"/>
+              <a:t>0</a:t>
+            </a:r>
+            <a:endParaRPr lang="en-AU" dirty="0"/>
+          </a:p>
+        </p:txBody>
+      </p:sp>
+      <p:sp>
+        <p:nvSpPr>
+          <p:cNvPr id="16" name="TextBox 15"/>
+          <p:cNvSpPr txBox="1"/>
+          <p:nvPr/>
+        </p:nvSpPr>
+        <p:spPr>
+          <a:xfrm>
+            <a:off x="3597706" y="1948934"/>
+            <a:ext cx="476412" cy="369332"/>
+          </a:xfrm>
+          <a:prstGeom prst="rect">
+            <a:avLst/>
+          </a:prstGeom>
+          <a:noFill/>
+        </p:spPr>
+        <p:txBody>
+          <a:bodyPr wrap="none" rtlCol="0">
+            <a:spAutoFit/>
+          </a:bodyPr>
+          <a:lstStyle/>
+          <a:p>
+            <a:r>
+              <a:rPr lang="en-AU" dirty="0" smtClean="0"/>
+              <a:t>0.1</a:t>
+            </a:r>
+            <a:endParaRPr lang="en-AU" dirty="0"/>
+          </a:p>
+        </p:txBody>
+      </p:sp>
+      <p:sp>
+        <p:nvSpPr>
+          <p:cNvPr id="17" name="TextBox 16"/>
+          <p:cNvSpPr txBox="1"/>
+          <p:nvPr/>
+        </p:nvSpPr>
+        <p:spPr>
+          <a:xfrm>
+            <a:off x="5529398" y="1948934"/>
+            <a:ext cx="476412" cy="369332"/>
+          </a:xfrm>
+          <a:prstGeom prst="rect">
+            <a:avLst/>
+          </a:prstGeom>
+          <a:noFill/>
+        </p:spPr>
+        <p:txBody>
+          <a:bodyPr wrap="none" rtlCol="0">
+            <a:spAutoFit/>
+          </a:bodyPr>
+          <a:lstStyle/>
+          <a:p>
+            <a:r>
+              <a:rPr lang="en-AU" dirty="0" smtClean="0"/>
+              <a:t>0.2</a:t>
+            </a:r>
+            <a:endParaRPr lang="en-AU" dirty="0"/>
+          </a:p>
+        </p:txBody>
+      </p:sp>
+      <p:sp>
+        <p:nvSpPr>
+          <p:cNvPr id="18" name="TextBox 17"/>
+          <p:cNvSpPr txBox="1"/>
+          <p:nvPr/>
+        </p:nvSpPr>
+        <p:spPr>
+          <a:xfrm>
+            <a:off x="7461090" y="1948934"/>
+            <a:ext cx="476412" cy="369332"/>
+          </a:xfrm>
+          <a:prstGeom prst="rect">
+            <a:avLst/>
+          </a:prstGeom>
+          <a:noFill/>
+        </p:spPr>
+        <p:txBody>
+          <a:bodyPr wrap="none" rtlCol="0">
+            <a:spAutoFit/>
+          </a:bodyPr>
+          <a:lstStyle/>
+          <a:p>
+            <a:r>
+              <a:rPr lang="en-AU" dirty="0" smtClean="0"/>
+              <a:t>0.3</a:t>
+            </a:r>
+            <a:endParaRPr lang="en-AU" dirty="0"/>
+          </a:p>
+        </p:txBody>
+      </p:sp>
+      <p:sp>
+        <p:nvSpPr>
+          <p:cNvPr id="19" name="TextBox 18"/>
+          <p:cNvSpPr txBox="1"/>
+          <p:nvPr/>
+        </p:nvSpPr>
+        <p:spPr>
+          <a:xfrm>
+            <a:off x="9581516" y="1948934"/>
+            <a:ext cx="476412" cy="369332"/>
+          </a:xfrm>
+          <a:prstGeom prst="rect">
+            <a:avLst/>
+          </a:prstGeom>
+          <a:noFill/>
+        </p:spPr>
+        <p:txBody>
+          <a:bodyPr wrap="none" rtlCol="0">
+            <a:spAutoFit/>
+          </a:bodyPr>
+          <a:lstStyle/>
+          <a:p>
+            <a:r>
+              <a:rPr lang="en-AU" dirty="0" smtClean="0"/>
+              <a:t>0.4</a:t>
+            </a:r>
+            <a:endParaRPr lang="en-AU" dirty="0"/>
+          </a:p>
+        </p:txBody>
+      </p:sp>
+      <p:sp>
+        <p:nvSpPr>
+          <p:cNvPr id="20" name="TextBox 19"/>
+          <p:cNvSpPr txBox="1"/>
+          <p:nvPr/>
+        </p:nvSpPr>
+        <p:spPr>
+          <a:xfrm>
+            <a:off x="1569720" y="4036814"/>
+            <a:ext cx="476412" cy="369332"/>
+          </a:xfrm>
+          <a:prstGeom prst="rect">
+            <a:avLst/>
+          </a:prstGeom>
+          <a:noFill/>
+        </p:spPr>
+        <p:txBody>
+          <a:bodyPr wrap="none" rtlCol="0">
+            <a:spAutoFit/>
+          </a:bodyPr>
+          <a:lstStyle/>
+          <a:p>
+            <a:r>
+              <a:rPr lang="en-AU" dirty="0" smtClean="0"/>
+              <a:t>0.5</a:t>
+            </a:r>
+            <a:endParaRPr lang="en-AU" dirty="0"/>
+          </a:p>
+        </p:txBody>
+      </p:sp>
+      <p:sp>
+        <p:nvSpPr>
+          <p:cNvPr id="21" name="TextBox 20"/>
+          <p:cNvSpPr txBox="1"/>
+          <p:nvPr/>
+        </p:nvSpPr>
+        <p:spPr>
+          <a:xfrm>
+            <a:off x="3597706" y="4036814"/>
+            <a:ext cx="476412" cy="369332"/>
+          </a:xfrm>
+          <a:prstGeom prst="rect">
+            <a:avLst/>
+          </a:prstGeom>
+          <a:noFill/>
+        </p:spPr>
+        <p:txBody>
+          <a:bodyPr wrap="none" rtlCol="0">
+            <a:spAutoFit/>
+          </a:bodyPr>
+          <a:lstStyle/>
+          <a:p>
+            <a:r>
+              <a:rPr lang="en-AU" dirty="0" smtClean="0"/>
+              <a:t>0.6</a:t>
+            </a:r>
+            <a:endParaRPr lang="en-AU" dirty="0"/>
+          </a:p>
+        </p:txBody>
+      </p:sp>
+      <p:sp>
+        <p:nvSpPr>
+          <p:cNvPr id="22" name="TextBox 21"/>
+          <p:cNvSpPr txBox="1"/>
+          <p:nvPr/>
+        </p:nvSpPr>
+        <p:spPr>
+          <a:xfrm>
+            <a:off x="5529398" y="4036814"/>
+            <a:ext cx="476412" cy="369332"/>
+          </a:xfrm>
+          <a:prstGeom prst="rect">
+            <a:avLst/>
+          </a:prstGeom>
+          <a:noFill/>
+        </p:spPr>
+        <p:txBody>
+          <a:bodyPr wrap="none" rtlCol="0">
+            <a:spAutoFit/>
+          </a:bodyPr>
+          <a:lstStyle/>
+          <a:p>
+            <a:r>
+              <a:rPr lang="en-AU" dirty="0" smtClean="0"/>
+              <a:t>0.7</a:t>
+            </a:r>
+            <a:endParaRPr lang="en-AU" dirty="0"/>
+          </a:p>
+        </p:txBody>
+      </p:sp>
+      <p:sp>
+        <p:nvSpPr>
+          <p:cNvPr id="23" name="TextBox 22"/>
+          <p:cNvSpPr txBox="1"/>
+          <p:nvPr/>
+        </p:nvSpPr>
+        <p:spPr>
+          <a:xfrm>
+            <a:off x="7461090" y="4036814"/>
+            <a:ext cx="476412" cy="369332"/>
+          </a:xfrm>
+          <a:prstGeom prst="rect">
+            <a:avLst/>
+          </a:prstGeom>
+          <a:noFill/>
+        </p:spPr>
+        <p:txBody>
+          <a:bodyPr wrap="none" rtlCol="0">
+            <a:spAutoFit/>
+          </a:bodyPr>
+          <a:lstStyle/>
+          <a:p>
+            <a:r>
+              <a:rPr lang="en-AU" dirty="0" smtClean="0"/>
+              <a:t>0.8</a:t>
+            </a:r>
+            <a:endParaRPr lang="en-AU" dirty="0"/>
+          </a:p>
+        </p:txBody>
+      </p:sp>
+      <p:sp>
+        <p:nvSpPr>
+          <p:cNvPr id="24" name="TextBox 23"/>
+          <p:cNvSpPr txBox="1"/>
+          <p:nvPr/>
+        </p:nvSpPr>
+        <p:spPr>
+          <a:xfrm>
+            <a:off x="9581516" y="4036814"/>
+            <a:ext cx="476412" cy="369332"/>
+          </a:xfrm>
+          <a:prstGeom prst="rect">
+            <a:avLst/>
+          </a:prstGeom>
+          <a:noFill/>
+        </p:spPr>
+        <p:txBody>
+          <a:bodyPr wrap="none" rtlCol="0">
+            <a:spAutoFit/>
+          </a:bodyPr>
+          <a:lstStyle/>
+          <a:p>
+            <a:r>
+              <a:rPr lang="en-AU" dirty="0" smtClean="0"/>
+              <a:t>0.9</a:t>
+            </a:r>
+            <a:endParaRPr lang="en-AU" dirty="0"/>
+          </a:p>
+        </p:txBody>
+      </p:sp>
+      <p:pic>
+        <p:nvPicPr>
+          <p:cNvPr id="26" name="Picture 25"/>
+          <p:cNvPicPr>
+            <a:picLocks noChangeAspect="1"/>
+          </p:cNvPicPr>
+          <p:nvPr/>
+        </p:nvPicPr>
+        <p:blipFill>
+          <a:blip r:embed="rId11"/>
+          <a:stretch>
+            <a:fillRect/>
+          </a:stretch>
+        </p:blipFill>
+        <p:spPr>
+          <a:xfrm>
+            <a:off x="511866" y="4548648"/>
+            <a:ext cx="3510680" cy="2110143"/>
+          </a:xfrm>
+          <a:prstGeom prst="rect">
+            <a:avLst/>
+          </a:prstGeom>
+        </p:spPr>
+      </p:pic>
+      <p:pic>
+        <p:nvPicPr>
+          <p:cNvPr id="27" name="Picture 26"/>
+          <p:cNvPicPr>
+            <a:picLocks noChangeAspect="1"/>
+          </p:cNvPicPr>
+          <p:nvPr/>
+        </p:nvPicPr>
+        <p:blipFill>
+          <a:blip r:embed="rId12"/>
+          <a:stretch>
+            <a:fillRect/>
+          </a:stretch>
+        </p:blipFill>
+        <p:spPr>
+          <a:xfrm>
+            <a:off x="4245665" y="4550422"/>
+            <a:ext cx="3839155" cy="2307578"/>
+          </a:xfrm>
+          <a:prstGeom prst="rect">
+            <a:avLst/>
+          </a:prstGeom>
+        </p:spPr>
+      </p:pic>
+      <p:sp>
+        <p:nvSpPr>
+          <p:cNvPr id="28" name="TextBox 27"/>
+          <p:cNvSpPr txBox="1"/>
+          <p:nvPr/>
+        </p:nvSpPr>
+        <p:spPr>
+          <a:xfrm>
+            <a:off x="8307939" y="4539799"/>
+            <a:ext cx="3579261" cy="2308324"/>
+          </a:xfrm>
+          <a:prstGeom prst="rect">
+            <a:avLst/>
+          </a:prstGeom>
+          <a:noFill/>
+        </p:spPr>
+        <p:txBody>
+          <a:bodyPr wrap="square" rtlCol="0">
+            <a:spAutoFit/>
+          </a:bodyPr>
+          <a:lstStyle/>
+          <a:p>
+            <a:r>
+              <a:rPr lang="en-AU" dirty="0" smtClean="0"/>
+              <a:t>For a full-size dragon, render factor is</a:t>
+            </a:r>
+          </a:p>
+          <a:p>
+            <a:r>
+              <a:rPr lang="en-AU" dirty="0" smtClean="0"/>
+              <a:t>1.6x i.e. WC = 1.6BC:</a:t>
+            </a:r>
+          </a:p>
+          <a:p>
+            <a:r>
+              <a:rPr lang="en-AU" dirty="0" smtClean="0"/>
+              <a:t>Speed = ~6.4 blocks per cycle</a:t>
+            </a:r>
+          </a:p>
+          <a:p>
+            <a:endParaRPr lang="en-AU" dirty="0"/>
+          </a:p>
+          <a:p>
+            <a:r>
+              <a:rPr lang="en-AU" dirty="0" smtClean="0"/>
+              <a:t>But each paw is only in contact with the ground for ~0.33 of a cycle</a:t>
+            </a:r>
+          </a:p>
+          <a:p>
+            <a:r>
+              <a:rPr lang="en-AU" dirty="0" smtClean="0">
+                <a:sym typeface="Wingdings" panose="05000000000000000000" pitchFamily="2" charset="2"/>
+              </a:rPr>
+              <a:t> May have </a:t>
+            </a:r>
+            <a:r>
+              <a:rPr lang="en-AU" smtClean="0">
+                <a:sym typeface="Wingdings" panose="05000000000000000000" pitchFamily="2" charset="2"/>
+              </a:rPr>
+              <a:t>to tweak it.</a:t>
+            </a:r>
+            <a:endParaRPr lang="en-AU" dirty="0"/>
+          </a:p>
+        </p:txBody>
+      </p:sp>
+    </p:spTree>
+    <p:extLst>
+      <p:ext uri="{BB962C8B-B14F-4D97-AF65-F5344CB8AC3E}">
+        <p14:creationId xmlns:p14="http://schemas.microsoft.com/office/powerpoint/2010/main" val="3989718169"/>
       </p:ext>
     </p:extLst>
   </p:cSld>

</xml_diff>

<commit_message>
Bugfix on throat position for smaller-than-adult dragons
</commit_message>
<xml_diff>
--- a/src/main/java/com/TheRPGAdventurer/ROTD/client/model/dragon/190706-DragonMountsDragonModel.pptx
+++ b/src/main/java/com/TheRPGAdventurer/ROTD/client/model/dragon/190706-DragonMountsDragonModel.pptx
@@ -17718,7 +17718,7 @@
         <p:spPr>
           <a:xfrm>
             <a:off x="8307939" y="4539799"/>
-            <a:ext cx="3579261" cy="2308324"/>
+            <a:ext cx="3579261" cy="2862322"/>
           </a:xfrm>
           <a:prstGeom prst="rect">
             <a:avLst/>
@@ -17745,7 +17745,13 @@
           <a:p>
             <a:r>
               <a:rPr lang="en-AU" dirty="0" smtClean="0"/>
-              <a:t>Speed = ~6.4 blocks per cycle</a:t>
+              <a:t>Speed = ~6.4WC blocks per cycle</a:t>
+            </a:r>
+          </a:p>
+          <a:p>
+            <a:r>
+              <a:rPr lang="en-AU" dirty="0" smtClean="0"/>
+              <a:t>= 4.0 BC blocks per cycle</a:t>
             </a:r>
           </a:p>
           <a:p>
@@ -17758,19 +17764,16 @@
             </a:r>
           </a:p>
           <a:p>
+            <a:pPr marL="285750" indent="-285750">
+              <a:buFont typeface="Wingdings" panose="05000000000000000000" pitchFamily="2" charset="2"/>
+              <a:buChar char="à"/>
+            </a:pPr>
             <a:r>
               <a:rPr lang="en-AU" dirty="0" smtClean="0">
                 <a:sym typeface="Wingdings" panose="05000000000000000000" pitchFamily="2" charset="2"/>
               </a:rPr>
-              <a:t> May have </a:t>
-            </a:r>
-            <a:r>
-              <a:rPr lang="en-AU" smtClean="0">
-                <a:sym typeface="Wingdings" panose="05000000000000000000" pitchFamily="2" charset="2"/>
-              </a:rPr>
-              <a:t>to tweak it.</a:t>
-            </a:r>
-            <a:endParaRPr lang="en-AU" dirty="0"/>
+              <a:t>May have to tweak it.  6.8 looks a bit better = about 4.2 BC</a:t>
+            </a:r>
           </a:p>
         </p:txBody>
       </p:sp>

</xml_diff>